<commit_message>
Modification backend : suppression users
</commit_message>
<xml_diff>
--- a/Présentation.pptx
+++ b/Présentation.pptx
@@ -1165,7 +1165,7 @@
         </p:nvSpPr>
         <p:spPr>
           <a:xfrm>
-            <a:off x="381300" y="685800"/>
+            <a:off x="381000" y="685800"/>
             <a:ext cx="6096000" cy="3429000"/>
           </a:xfrm>
           <a:custGeom>
@@ -7601,10 +7601,10 @@
               <a:buChar char="●"/>
             </a:pPr>
             <a:r>
-              <a:rPr lang="fr" sz="3100"/>
+              <a:rPr lang="fr" sz="3100" dirty="0"/>
               <a:t>FRAMEWORK :         VUEJS</a:t>
             </a:r>
-            <a:endParaRPr sz="3100"/>
+            <a:endParaRPr sz="3100" dirty="0"/>
           </a:p>
           <a:p>
             <a:pPr marL="0" lvl="0" indent="0" algn="l" rtl="0">
@@ -7616,7 +7616,7 @@
               </a:spcAft>
               <a:buNone/>
             </a:pPr>
-            <a:endParaRPr sz="3100"/>
+            <a:endParaRPr sz="3100" dirty="0"/>
           </a:p>
           <a:p>
             <a:pPr marL="457200" lvl="0" indent="-425450" algn="l" rtl="0">
@@ -7630,33 +7630,10 @@
               <a:buChar char="●"/>
             </a:pPr>
             <a:r>
-              <a:rPr lang="fr" sz="3100"/>
-              <a:t>AXIOS                  :     ( V  0.21.1)</a:t>
+              <a:rPr lang="fr" sz="3100" dirty="0"/>
+              <a:t>AXIOS  : Client HTTP basé sur des promesses    ( V  0.21.1).</a:t>
             </a:r>
-            <a:endParaRPr sz="2350">
-              <a:solidFill>
-                <a:srgbClr val="CE9178"/>
-              </a:solidFill>
-              <a:highlight>
-                <a:srgbClr val="1E1E1E"/>
-              </a:highlight>
-              <a:latin typeface="Courier New"/>
-              <a:ea typeface="Courier New"/>
-              <a:cs typeface="Courier New"/>
-              <a:sym typeface="Courier New"/>
-            </a:endParaRPr>
-          </a:p>
-          <a:p>
-            <a:pPr marL="457200" lvl="0" indent="0" algn="l" rtl="0">
-              <a:spcBef>
-                <a:spcPts val="1200"/>
-              </a:spcBef>
-              <a:spcAft>
-                <a:spcPts val="1200"/>
-              </a:spcAft>
-              <a:buNone/>
-            </a:pPr>
-            <a:endParaRPr/>
+            <a:endParaRPr dirty="0"/>
           </a:p>
         </p:txBody>
       </p:sp>
@@ -7720,10 +7697,10 @@
               <a:buNone/>
             </a:pPr>
             <a:r>
-              <a:rPr lang="fr"/>
-              <a:t>			POINTS D'AMÉLIORATION</a:t>
+              <a:rPr lang="fr" dirty="0"/>
+              <a:t>	POINTS D'AMÉLIORATION</a:t>
             </a:r>
-            <a:endParaRPr/>
+            <a:endParaRPr dirty="0"/>
           </a:p>
         </p:txBody>
       </p:sp>
@@ -7763,7 +7740,7 @@
               <a:buChar char="●"/>
             </a:pPr>
             <a:r>
-              <a:rPr lang="fr" dirty="0"/>
+              <a:rPr lang="fr" sz="2800" dirty="0"/>
               <a:t>Like – Dislike</a:t>
             </a:r>
           </a:p>
@@ -7778,7 +7755,7 @@
               <a:buSzPts val="1800"/>
               <a:buChar char="●"/>
             </a:pPr>
-            <a:endParaRPr lang="fr" dirty="0"/>
+            <a:endParaRPr lang="fr" sz="2800" dirty="0"/>
           </a:p>
           <a:p>
             <a:pPr marL="457200" lvl="0" indent="-342900" algn="l" rtl="0">
@@ -7792,7 +7769,7 @@
               <a:buChar char="●"/>
             </a:pPr>
             <a:r>
-              <a:rPr lang="fr" dirty="0"/>
+              <a:rPr lang="fr" sz="2800" dirty="0"/>
               <a:t>Affichage Photo des utilisateurs</a:t>
             </a:r>
           </a:p>
@@ -7807,7 +7784,7 @@
               <a:buSzPts val="1800"/>
               <a:buChar char="●"/>
             </a:pPr>
-            <a:endParaRPr lang="fr" dirty="0"/>
+            <a:endParaRPr lang="fr" sz="2800" dirty="0"/>
           </a:p>
           <a:p>
             <a:pPr marL="457200" lvl="0" indent="-342900" algn="l" rtl="0">
@@ -7821,10 +7798,10 @@
               <a:buChar char="●"/>
             </a:pPr>
             <a:r>
-              <a:rPr lang="fr" dirty="0"/>
+              <a:rPr lang="fr" sz="2800" dirty="0"/>
               <a:t>Service d’Affectation des  utilisateurs</a:t>
             </a:r>
-            <a:endParaRPr dirty="0"/>
+            <a:endParaRPr sz="2800" dirty="0"/>
           </a:p>
           <a:p>
             <a:pPr marL="457200" lvl="0" indent="-342900" algn="l" rtl="0">

</xml_diff>